<commit_message>
Update FUN BUT TUT (#1592; YW)
</commit_message>
<xml_diff>
--- a/tutorials/pipelines/tut_a_fun_bud/vector files/fig07_big.pptx
+++ b/tutorials/pipelines/tut_a_fun_bud/vector files/fig07_big.pptx
@@ -243,7 +243,7 @@
           <a:p>
             <a:fld id="{CA1BB51F-BFC6-4DD3-8C2A-5B21FD6F69C3}" type="datetimeFigureOut">
               <a:rPr lang="en-SE" smtClean="0"/>
-              <a:t>10/01/2023</a:t>
+              <a:t>2023-10-05</a:t>
             </a:fld>
             <a:endParaRPr lang="en-SE"/>
           </a:p>
@@ -413,7 +413,7 @@
           <a:p>
             <a:fld id="{CA1BB51F-BFC6-4DD3-8C2A-5B21FD6F69C3}" type="datetimeFigureOut">
               <a:rPr lang="en-SE" smtClean="0"/>
-              <a:t>10/01/2023</a:t>
+              <a:t>2023-10-05</a:t>
             </a:fld>
             <a:endParaRPr lang="en-SE"/>
           </a:p>
@@ -593,7 +593,7 @@
           <a:p>
             <a:fld id="{CA1BB51F-BFC6-4DD3-8C2A-5B21FD6F69C3}" type="datetimeFigureOut">
               <a:rPr lang="en-SE" smtClean="0"/>
-              <a:t>10/01/2023</a:t>
+              <a:t>2023-10-05</a:t>
             </a:fld>
             <a:endParaRPr lang="en-SE"/>
           </a:p>
@@ -763,7 +763,7 @@
           <a:p>
             <a:fld id="{CA1BB51F-BFC6-4DD3-8C2A-5B21FD6F69C3}" type="datetimeFigureOut">
               <a:rPr lang="en-SE" smtClean="0"/>
-              <a:t>10/01/2023</a:t>
+              <a:t>2023-10-05</a:t>
             </a:fld>
             <a:endParaRPr lang="en-SE"/>
           </a:p>
@@ -1007,7 +1007,7 @@
           <a:p>
             <a:fld id="{CA1BB51F-BFC6-4DD3-8C2A-5B21FD6F69C3}" type="datetimeFigureOut">
               <a:rPr lang="en-SE" smtClean="0"/>
-              <a:t>10/01/2023</a:t>
+              <a:t>2023-10-05</a:t>
             </a:fld>
             <a:endParaRPr lang="en-SE"/>
           </a:p>
@@ -1239,7 +1239,7 @@
           <a:p>
             <a:fld id="{CA1BB51F-BFC6-4DD3-8C2A-5B21FD6F69C3}" type="datetimeFigureOut">
               <a:rPr lang="en-SE" smtClean="0"/>
-              <a:t>10/01/2023</a:t>
+              <a:t>2023-10-05</a:t>
             </a:fld>
             <a:endParaRPr lang="en-SE"/>
           </a:p>
@@ -1606,7 +1606,7 @@
           <a:p>
             <a:fld id="{CA1BB51F-BFC6-4DD3-8C2A-5B21FD6F69C3}" type="datetimeFigureOut">
               <a:rPr lang="en-SE" smtClean="0"/>
-              <a:t>10/01/2023</a:t>
+              <a:t>2023-10-05</a:t>
             </a:fld>
             <a:endParaRPr lang="en-SE"/>
           </a:p>
@@ -1724,7 +1724,7 @@
           <a:p>
             <a:fld id="{CA1BB51F-BFC6-4DD3-8C2A-5B21FD6F69C3}" type="datetimeFigureOut">
               <a:rPr lang="en-SE" smtClean="0"/>
-              <a:t>10/01/2023</a:t>
+              <a:t>2023-10-05</a:t>
             </a:fld>
             <a:endParaRPr lang="en-SE"/>
           </a:p>
@@ -1819,7 +1819,7 @@
           <a:p>
             <a:fld id="{CA1BB51F-BFC6-4DD3-8C2A-5B21FD6F69C3}" type="datetimeFigureOut">
               <a:rPr lang="en-SE" smtClean="0"/>
-              <a:t>10/01/2023</a:t>
+              <a:t>2023-10-05</a:t>
             </a:fld>
             <a:endParaRPr lang="en-SE"/>
           </a:p>
@@ -2096,7 +2096,7 @@
           <a:p>
             <a:fld id="{CA1BB51F-BFC6-4DD3-8C2A-5B21FD6F69C3}" type="datetimeFigureOut">
               <a:rPr lang="en-SE" smtClean="0"/>
-              <a:t>10/01/2023</a:t>
+              <a:t>2023-10-05</a:t>
             </a:fld>
             <a:endParaRPr lang="en-SE"/>
           </a:p>
@@ -2353,7 +2353,7 @@
           <a:p>
             <a:fld id="{CA1BB51F-BFC6-4DD3-8C2A-5B21FD6F69C3}" type="datetimeFigureOut">
               <a:rPr lang="en-SE" smtClean="0"/>
-              <a:t>10/01/2023</a:t>
+              <a:t>2023-10-05</a:t>
             </a:fld>
             <a:endParaRPr lang="en-SE"/>
           </a:p>
@@ -2566,7 +2566,7 @@
           <a:p>
             <a:fld id="{CA1BB51F-BFC6-4DD3-8C2A-5B21FD6F69C3}" type="datetimeFigureOut">
               <a:rPr lang="en-SE" smtClean="0"/>
-              <a:t>10/01/2023</a:t>
+              <a:t>2023-10-05</a:t>
             </a:fld>
             <a:endParaRPr lang="en-SE"/>
           </a:p>
@@ -3100,7 +3100,7 @@
         </p:nvSpPr>
         <p:spPr>
           <a:xfrm>
-            <a:off x="6895365" y="519915"/>
+            <a:off x="7929943" y="435694"/>
             <a:ext cx="444891" cy="444891"/>
           </a:xfrm>
           <a:prstGeom prst="ellipse">

</xml_diff>

<commit_message>
Revert "Merge branch 'develop' into jws_revise_description"
This reverts commit d772dedf1018251a363603d76365f7ac88f9bea6, reversing
changes made to d4660670c0ff95f31d22f02f514d4298900dd826.
</commit_message>
<xml_diff>
--- a/tutorials/pipelines/tut_a_fun_bud/vector files/fig07_big.pptx
+++ b/tutorials/pipelines/tut_a_fun_bud/vector files/fig07_big.pptx
@@ -243,7 +243,7 @@
           <a:p>
             <a:fld id="{CA1BB51F-BFC6-4DD3-8C2A-5B21FD6F69C3}" type="datetimeFigureOut">
               <a:rPr lang="en-SE" smtClean="0"/>
-              <a:t>2023-10-05</a:t>
+              <a:t>10/01/2023</a:t>
             </a:fld>
             <a:endParaRPr lang="en-SE"/>
           </a:p>
@@ -413,7 +413,7 @@
           <a:p>
             <a:fld id="{CA1BB51F-BFC6-4DD3-8C2A-5B21FD6F69C3}" type="datetimeFigureOut">
               <a:rPr lang="en-SE" smtClean="0"/>
-              <a:t>2023-10-05</a:t>
+              <a:t>10/01/2023</a:t>
             </a:fld>
             <a:endParaRPr lang="en-SE"/>
           </a:p>
@@ -593,7 +593,7 @@
           <a:p>
             <a:fld id="{CA1BB51F-BFC6-4DD3-8C2A-5B21FD6F69C3}" type="datetimeFigureOut">
               <a:rPr lang="en-SE" smtClean="0"/>
-              <a:t>2023-10-05</a:t>
+              <a:t>10/01/2023</a:t>
             </a:fld>
             <a:endParaRPr lang="en-SE"/>
           </a:p>
@@ -763,7 +763,7 @@
           <a:p>
             <a:fld id="{CA1BB51F-BFC6-4DD3-8C2A-5B21FD6F69C3}" type="datetimeFigureOut">
               <a:rPr lang="en-SE" smtClean="0"/>
-              <a:t>2023-10-05</a:t>
+              <a:t>10/01/2023</a:t>
             </a:fld>
             <a:endParaRPr lang="en-SE"/>
           </a:p>
@@ -1007,7 +1007,7 @@
           <a:p>
             <a:fld id="{CA1BB51F-BFC6-4DD3-8C2A-5B21FD6F69C3}" type="datetimeFigureOut">
               <a:rPr lang="en-SE" smtClean="0"/>
-              <a:t>2023-10-05</a:t>
+              <a:t>10/01/2023</a:t>
             </a:fld>
             <a:endParaRPr lang="en-SE"/>
           </a:p>
@@ -1239,7 +1239,7 @@
           <a:p>
             <a:fld id="{CA1BB51F-BFC6-4DD3-8C2A-5B21FD6F69C3}" type="datetimeFigureOut">
               <a:rPr lang="en-SE" smtClean="0"/>
-              <a:t>2023-10-05</a:t>
+              <a:t>10/01/2023</a:t>
             </a:fld>
             <a:endParaRPr lang="en-SE"/>
           </a:p>
@@ -1606,7 +1606,7 @@
           <a:p>
             <a:fld id="{CA1BB51F-BFC6-4DD3-8C2A-5B21FD6F69C3}" type="datetimeFigureOut">
               <a:rPr lang="en-SE" smtClean="0"/>
-              <a:t>2023-10-05</a:t>
+              <a:t>10/01/2023</a:t>
             </a:fld>
             <a:endParaRPr lang="en-SE"/>
           </a:p>
@@ -1724,7 +1724,7 @@
           <a:p>
             <a:fld id="{CA1BB51F-BFC6-4DD3-8C2A-5B21FD6F69C3}" type="datetimeFigureOut">
               <a:rPr lang="en-SE" smtClean="0"/>
-              <a:t>2023-10-05</a:t>
+              <a:t>10/01/2023</a:t>
             </a:fld>
             <a:endParaRPr lang="en-SE"/>
           </a:p>
@@ -1819,7 +1819,7 @@
           <a:p>
             <a:fld id="{CA1BB51F-BFC6-4DD3-8C2A-5B21FD6F69C3}" type="datetimeFigureOut">
               <a:rPr lang="en-SE" smtClean="0"/>
-              <a:t>2023-10-05</a:t>
+              <a:t>10/01/2023</a:t>
             </a:fld>
             <a:endParaRPr lang="en-SE"/>
           </a:p>
@@ -2096,7 +2096,7 @@
           <a:p>
             <a:fld id="{CA1BB51F-BFC6-4DD3-8C2A-5B21FD6F69C3}" type="datetimeFigureOut">
               <a:rPr lang="en-SE" smtClean="0"/>
-              <a:t>2023-10-05</a:t>
+              <a:t>10/01/2023</a:t>
             </a:fld>
             <a:endParaRPr lang="en-SE"/>
           </a:p>
@@ -2353,7 +2353,7 @@
           <a:p>
             <a:fld id="{CA1BB51F-BFC6-4DD3-8C2A-5B21FD6F69C3}" type="datetimeFigureOut">
               <a:rPr lang="en-SE" smtClean="0"/>
-              <a:t>2023-10-05</a:t>
+              <a:t>10/01/2023</a:t>
             </a:fld>
             <a:endParaRPr lang="en-SE"/>
           </a:p>
@@ -2566,7 +2566,7 @@
           <a:p>
             <a:fld id="{CA1BB51F-BFC6-4DD3-8C2A-5B21FD6F69C3}" type="datetimeFigureOut">
               <a:rPr lang="en-SE" smtClean="0"/>
-              <a:t>2023-10-05</a:t>
+              <a:t>10/01/2023</a:t>
             </a:fld>
             <a:endParaRPr lang="en-SE"/>
           </a:p>
@@ -3100,7 +3100,7 @@
         </p:nvSpPr>
         <p:spPr>
           <a:xfrm>
-            <a:off x="7929943" y="435694"/>
+            <a:off x="6895365" y="519915"/>
             <a:ext cx="444891" cy="444891"/>
           </a:xfrm>
           <a:prstGeom prst="ellipse">

</xml_diff>

<commit_message>
Revert "Revert "Merge branch 'develop' into jws_revise_description""
This reverts commit f5efc556eb87027dca1149e9e11ec179374c03dd.
</commit_message>
<xml_diff>
--- a/tutorials/pipelines/tut_a_fun_bud/vector files/fig07_big.pptx
+++ b/tutorials/pipelines/tut_a_fun_bud/vector files/fig07_big.pptx
@@ -243,7 +243,7 @@
           <a:p>
             <a:fld id="{CA1BB51F-BFC6-4DD3-8C2A-5B21FD6F69C3}" type="datetimeFigureOut">
               <a:rPr lang="en-SE" smtClean="0"/>
-              <a:t>10/01/2023</a:t>
+              <a:t>2023-10-05</a:t>
             </a:fld>
             <a:endParaRPr lang="en-SE"/>
           </a:p>
@@ -413,7 +413,7 @@
           <a:p>
             <a:fld id="{CA1BB51F-BFC6-4DD3-8C2A-5B21FD6F69C3}" type="datetimeFigureOut">
               <a:rPr lang="en-SE" smtClean="0"/>
-              <a:t>10/01/2023</a:t>
+              <a:t>2023-10-05</a:t>
             </a:fld>
             <a:endParaRPr lang="en-SE"/>
           </a:p>
@@ -593,7 +593,7 @@
           <a:p>
             <a:fld id="{CA1BB51F-BFC6-4DD3-8C2A-5B21FD6F69C3}" type="datetimeFigureOut">
               <a:rPr lang="en-SE" smtClean="0"/>
-              <a:t>10/01/2023</a:t>
+              <a:t>2023-10-05</a:t>
             </a:fld>
             <a:endParaRPr lang="en-SE"/>
           </a:p>
@@ -763,7 +763,7 @@
           <a:p>
             <a:fld id="{CA1BB51F-BFC6-4DD3-8C2A-5B21FD6F69C3}" type="datetimeFigureOut">
               <a:rPr lang="en-SE" smtClean="0"/>
-              <a:t>10/01/2023</a:t>
+              <a:t>2023-10-05</a:t>
             </a:fld>
             <a:endParaRPr lang="en-SE"/>
           </a:p>
@@ -1007,7 +1007,7 @@
           <a:p>
             <a:fld id="{CA1BB51F-BFC6-4DD3-8C2A-5B21FD6F69C3}" type="datetimeFigureOut">
               <a:rPr lang="en-SE" smtClean="0"/>
-              <a:t>10/01/2023</a:t>
+              <a:t>2023-10-05</a:t>
             </a:fld>
             <a:endParaRPr lang="en-SE"/>
           </a:p>
@@ -1239,7 +1239,7 @@
           <a:p>
             <a:fld id="{CA1BB51F-BFC6-4DD3-8C2A-5B21FD6F69C3}" type="datetimeFigureOut">
               <a:rPr lang="en-SE" smtClean="0"/>
-              <a:t>10/01/2023</a:t>
+              <a:t>2023-10-05</a:t>
             </a:fld>
             <a:endParaRPr lang="en-SE"/>
           </a:p>
@@ -1606,7 +1606,7 @@
           <a:p>
             <a:fld id="{CA1BB51F-BFC6-4DD3-8C2A-5B21FD6F69C3}" type="datetimeFigureOut">
               <a:rPr lang="en-SE" smtClean="0"/>
-              <a:t>10/01/2023</a:t>
+              <a:t>2023-10-05</a:t>
             </a:fld>
             <a:endParaRPr lang="en-SE"/>
           </a:p>
@@ -1724,7 +1724,7 @@
           <a:p>
             <a:fld id="{CA1BB51F-BFC6-4DD3-8C2A-5B21FD6F69C3}" type="datetimeFigureOut">
               <a:rPr lang="en-SE" smtClean="0"/>
-              <a:t>10/01/2023</a:t>
+              <a:t>2023-10-05</a:t>
             </a:fld>
             <a:endParaRPr lang="en-SE"/>
           </a:p>
@@ -1819,7 +1819,7 @@
           <a:p>
             <a:fld id="{CA1BB51F-BFC6-4DD3-8C2A-5B21FD6F69C3}" type="datetimeFigureOut">
               <a:rPr lang="en-SE" smtClean="0"/>
-              <a:t>10/01/2023</a:t>
+              <a:t>2023-10-05</a:t>
             </a:fld>
             <a:endParaRPr lang="en-SE"/>
           </a:p>
@@ -2096,7 +2096,7 @@
           <a:p>
             <a:fld id="{CA1BB51F-BFC6-4DD3-8C2A-5B21FD6F69C3}" type="datetimeFigureOut">
               <a:rPr lang="en-SE" smtClean="0"/>
-              <a:t>10/01/2023</a:t>
+              <a:t>2023-10-05</a:t>
             </a:fld>
             <a:endParaRPr lang="en-SE"/>
           </a:p>
@@ -2353,7 +2353,7 @@
           <a:p>
             <a:fld id="{CA1BB51F-BFC6-4DD3-8C2A-5B21FD6F69C3}" type="datetimeFigureOut">
               <a:rPr lang="en-SE" smtClean="0"/>
-              <a:t>10/01/2023</a:t>
+              <a:t>2023-10-05</a:t>
             </a:fld>
             <a:endParaRPr lang="en-SE"/>
           </a:p>
@@ -2566,7 +2566,7 @@
           <a:p>
             <a:fld id="{CA1BB51F-BFC6-4DD3-8C2A-5B21FD6F69C3}" type="datetimeFigureOut">
               <a:rPr lang="en-SE" smtClean="0"/>
-              <a:t>10/01/2023</a:t>
+              <a:t>2023-10-05</a:t>
             </a:fld>
             <a:endParaRPr lang="en-SE"/>
           </a:p>
@@ -3100,7 +3100,7 @@
         </p:nvSpPr>
         <p:spPr>
           <a:xfrm>
-            <a:off x="6895365" y="519915"/>
+            <a:off x="7929943" y="435694"/>
             <a:ext cx="444891" cy="444891"/>
           </a:xfrm>
           <a:prstGeom prst="ellipse">

</xml_diff>